<commit_message>
[Agalya] Changed the project template with latest updates
</commit_message>
<xml_diff>
--- a/meeting_project_progress_template_week23-10-15.pptx
+++ b/meeting_project_progress_template_week23-10-15.pptx
@@ -208,7 +208,7 @@
           <a:p>
             <a:fld id="{4299A190-B0A1-4D43-B23A-257FD21AC86B}" type="datetimeFigureOut">
               <a:rPr lang="en-US" smtClean="0"/>
-              <a:t>10/22/2015</a:t>
+              <a:t>10/22/15</a:t>
             </a:fld>
             <a:endParaRPr lang="en-US"/>
           </a:p>
@@ -786,7 +786,7 @@
           <a:p>
             <a:fld id="{1FEB7409-3250-4C50-AF25-98F0055930D5}" type="datetimeFigureOut">
               <a:rPr lang="en-US" smtClean="0"/>
-              <a:t>10/22/2015</a:t>
+              <a:t>10/22/15</a:t>
             </a:fld>
             <a:endParaRPr lang="en-US"/>
           </a:p>
@@ -994,7 +994,7 @@
           <a:p>
             <a:fld id="{1FEB7409-3250-4C50-AF25-98F0055930D5}" type="datetimeFigureOut">
               <a:rPr lang="en-US" smtClean="0"/>
-              <a:t>10/22/2015</a:t>
+              <a:t>10/22/15</a:t>
             </a:fld>
             <a:endParaRPr lang="en-US"/>
           </a:p>
@@ -1250,7 +1250,7 @@
           <a:p>
             <a:fld id="{1FEB7409-3250-4C50-AF25-98F0055930D5}" type="datetimeFigureOut">
               <a:rPr lang="en-US" smtClean="0"/>
-              <a:t>10/22/2015</a:t>
+              <a:t>10/22/15</a:t>
             </a:fld>
             <a:endParaRPr lang="en-US"/>
           </a:p>
@@ -1424,7 +1424,7 @@
           <a:p>
             <a:fld id="{1FEB7409-3250-4C50-AF25-98F0055930D5}" type="datetimeFigureOut">
               <a:rPr lang="en-US" smtClean="0"/>
-              <a:t>10/22/2015</a:t>
+              <a:t>10/22/15</a:t>
             </a:fld>
             <a:endParaRPr lang="en-US"/>
           </a:p>
@@ -1767,7 +1767,7 @@
           <a:p>
             <a:fld id="{1FEB7409-3250-4C50-AF25-98F0055930D5}" type="datetimeFigureOut">
               <a:rPr lang="en-US" smtClean="0"/>
-              <a:t>10/22/2015</a:t>
+              <a:t>10/22/15</a:t>
             </a:fld>
             <a:endParaRPr lang="en-US"/>
           </a:p>
@@ -2042,7 +2042,7 @@
           <a:p>
             <a:fld id="{1FEB7409-3250-4C50-AF25-98F0055930D5}" type="datetimeFigureOut">
               <a:rPr lang="en-US" smtClean="0"/>
-              <a:t>10/22/2015</a:t>
+              <a:t>10/22/15</a:t>
             </a:fld>
             <a:endParaRPr lang="en-US"/>
           </a:p>
@@ -2421,7 +2421,7 @@
           <a:p>
             <a:fld id="{1FEB7409-3250-4C50-AF25-98F0055930D5}" type="datetimeFigureOut">
               <a:rPr lang="en-US" smtClean="0"/>
-              <a:t>10/22/2015</a:t>
+              <a:t>10/22/15</a:t>
             </a:fld>
             <a:endParaRPr lang="en-US"/>
           </a:p>
@@ -2539,7 +2539,7 @@
           <a:p>
             <a:fld id="{1FEB7409-3250-4C50-AF25-98F0055930D5}" type="datetimeFigureOut">
               <a:rPr lang="en-US" smtClean="0"/>
-              <a:t>10/22/2015</a:t>
+              <a:t>10/22/15</a:t>
             </a:fld>
             <a:endParaRPr lang="en-US"/>
           </a:p>
@@ -2710,7 +2710,7 @@
           <a:p>
             <a:fld id="{1FEB7409-3250-4C50-AF25-98F0055930D5}" type="datetimeFigureOut">
               <a:rPr lang="en-US" smtClean="0"/>
-              <a:t>10/22/2015</a:t>
+              <a:t>10/22/15</a:t>
             </a:fld>
             <a:endParaRPr lang="en-US"/>
           </a:p>
@@ -3064,7 +3064,7 @@
           <a:p>
             <a:fld id="{1FEB7409-3250-4C50-AF25-98F0055930D5}" type="datetimeFigureOut">
               <a:rPr lang="en-US" smtClean="0"/>
-              <a:t>10/22/2015</a:t>
+              <a:t>10/22/15</a:t>
             </a:fld>
             <a:endParaRPr lang="en-US"/>
           </a:p>
@@ -3446,7 +3446,7 @@
           <a:p>
             <a:fld id="{1FEB7409-3250-4C50-AF25-98F0055930D5}" type="datetimeFigureOut">
               <a:rPr lang="en-US" smtClean="0"/>
-              <a:t>10/22/2015</a:t>
+              <a:t>10/22/15</a:t>
             </a:fld>
             <a:endParaRPr lang="en-US"/>
           </a:p>
@@ -3733,7 +3733,7 @@
           <a:p>
             <a:fld id="{1FEB7409-3250-4C50-AF25-98F0055930D5}" type="datetimeFigureOut">
               <a:rPr lang="en-US" smtClean="0"/>
-              <a:t>10/22/2015</a:t>
+              <a:t>10/22/15</a:t>
             </a:fld>
             <a:endParaRPr lang="en-US"/>
           </a:p>
@@ -4298,7 +4298,7 @@
         </p:spPr>
         <p:txBody>
           <a:bodyPr>
-            <a:normAutofit/>
+            <a:normAutofit fontScale="92500" lnSpcReduction="20000"/>
           </a:bodyPr>
           <a:lstStyle/>
           <a:p>
@@ -4312,38 +4312,89 @@
             <a:pPr lvl="1"/>
             <a:r>
               <a:rPr lang="en-US" dirty="0" smtClean="0"/>
-              <a:t>Completing the adaptation of the Naïve based classifier to predict the Geo location of a user</a:t>
+              <a:t>Content based location prediction for a microblog user is done using different evaluation models</a:t>
+            </a:r>
+          </a:p>
+          <a:p>
+            <a:pPr lvl="1"/>
+            <a:r>
+              <a:rPr lang="en-US" dirty="0" smtClean="0"/>
+              <a:t>Community based location prediction prototype</a:t>
+            </a:r>
+          </a:p>
+          <a:p>
+            <a:pPr marL="201168" lvl="1" indent="0">
+              <a:buNone/>
+            </a:pPr>
+            <a:r>
+              <a:rPr lang="en-US" dirty="0" smtClean="0"/>
+              <a:t>    is done.</a:t>
+            </a:r>
+            <a:r>
+              <a:rPr lang="en-US" dirty="0" smtClean="0"/>
+              <a:t> </a:t>
+            </a:r>
+          </a:p>
+          <a:p>
+            <a:r>
+              <a:rPr lang="en-US" b="1" dirty="0" smtClean="0"/>
+              <a:t>2</a:t>
+            </a:r>
+            <a:r>
+              <a:rPr lang="en-US" b="1" dirty="0" smtClean="0"/>
+              <a:t>. Actual progress toward the goals</a:t>
+            </a:r>
+          </a:p>
+          <a:p>
+            <a:pPr lvl="1"/>
+            <a:r>
+              <a:rPr lang="en-US" dirty="0" smtClean="0"/>
+              <a:t>Data scrapping for users and their tweets completed, </a:t>
+            </a:r>
+            <a:r>
+              <a:rPr lang="en-US" dirty="0" smtClean="0"/>
+              <a:t> hit four </a:t>
+            </a:r>
+            <a:r>
+              <a:rPr lang="en-US" dirty="0" smtClean="0"/>
+              <a:t>million records.</a:t>
+            </a:r>
+          </a:p>
+          <a:p>
+            <a:pPr lvl="1"/>
+            <a:r>
+              <a:rPr lang="en-US" dirty="0" smtClean="0"/>
+              <a:t>Scripts to remove bots, celebrities and outliers were done using Heuristics based approaches</a:t>
             </a:r>
             <a:endParaRPr lang="en-US" dirty="0" smtClean="0"/>
           </a:p>
           <a:p>
-            <a:r>
-              <a:rPr lang="en-US" b="1" dirty="0" smtClean="0"/>
-              <a:t>2. Actual progress toward the goals</a:t>
-            </a:r>
-          </a:p>
-          <a:p>
             <a:pPr lvl="1"/>
             <a:r>
               <a:rPr lang="en-US" dirty="0" smtClean="0"/>
-              <a:t>Data scrapping for users and their tweets completed, collectively generated four million records.</a:t>
-            </a:r>
-            <a:endParaRPr lang="en-US" dirty="0" smtClean="0"/>
+              <a:t>Training an adaptation of Naïve based classifier by the output generated by the data gathering and collection scripts</a:t>
+            </a:r>
+            <a:r>
+              <a:rPr lang="en-US" dirty="0" smtClean="0"/>
+              <a:t>.</a:t>
+            </a:r>
           </a:p>
           <a:p>
             <a:pPr lvl="1"/>
             <a:r>
               <a:rPr lang="en-US" dirty="0" smtClean="0"/>
-              <a:t>Scripts to segregate the data based on state names, cleaning the data of the noise generated by bots, removing stop words, removing celebrity profiles were built and tested.</a:t>
-            </a:r>
-            <a:endParaRPr lang="en-US" dirty="0" smtClean="0"/>
+              <a:t>Training content similarity model with the tweets collected and benchmarked performance with test dataset.</a:t>
+            </a:r>
           </a:p>
           <a:p>
             <a:pPr lvl="1"/>
             <a:r>
               <a:rPr lang="en-US" dirty="0" smtClean="0"/>
-              <a:t>Training an adaptation of Naïve based classifier by the output generated by the data gathering and collection scripts.</a:t>
-            </a:r>
+              <a:t>Community detection is run on the collection of users and their geolocation within the community is being analyzed.</a:t>
+            </a:r>
+          </a:p>
+          <a:p>
+            <a:pPr lvl="1"/>
             <a:endParaRPr lang="en-US" dirty="0"/>
           </a:p>
           <a:p>
@@ -4369,33 +4420,39 @@
         </p:spPr>
         <p:txBody>
           <a:bodyPr>
-            <a:normAutofit/>
+            <a:normAutofit fontScale="92500" lnSpcReduction="20000"/>
           </a:bodyPr>
           <a:lstStyle/>
           <a:p>
             <a:r>
               <a:rPr lang="en-US" b="1" dirty="0" smtClean="0"/>
-              <a:t>3. Goals for next </a:t>
-            </a:r>
-            <a:r>
-              <a:rPr lang="en-US" b="1" dirty="0" smtClean="0"/>
-              <a:t>week</a:t>
-            </a:r>
-            <a:endParaRPr lang="en-US" b="1" dirty="0" smtClean="0"/>
+              <a:t>3. Goals for next week</a:t>
+            </a:r>
           </a:p>
           <a:p>
             <a:pPr lvl="1"/>
             <a:r>
               <a:rPr lang="en-US" dirty="0" smtClean="0"/>
-              <a:t>Completing the adaptation of Geolocation prediction algorithm by using community detection principles.</a:t>
-            </a:r>
-            <a:endParaRPr lang="en-US" dirty="0" smtClean="0"/>
+              <a:t>Benchmarking the </a:t>
+            </a:r>
+            <a:r>
+              <a:rPr lang="en-US" dirty="0" smtClean="0"/>
+              <a:t>adaptation of Geolocation prediction algorithm by using community detection principles.</a:t>
+            </a:r>
           </a:p>
           <a:p>
             <a:pPr lvl="1"/>
             <a:r>
               <a:rPr lang="en-US" dirty="0" smtClean="0"/>
-              <a:t>Comparison of the precision thresholds produced by the Naïve based classifier and the community detection algorithm for predicting the Geolocation of a user set.</a:t>
+              <a:t>Comparison of the precision thresholds produced by the </a:t>
+            </a:r>
+            <a:r>
+              <a:rPr lang="en-US" dirty="0" smtClean="0"/>
+              <a:t>Content based classifiers and </a:t>
+            </a:r>
+            <a:r>
+              <a:rPr lang="en-US" dirty="0" smtClean="0"/>
+              <a:t>the community detection algorithm for predicting the Geolocation of a user set.</a:t>
             </a:r>
           </a:p>
           <a:p>
@@ -4412,7 +4469,22 @@
             <a:pPr lvl="1"/>
             <a:r>
               <a:rPr lang="en-US" dirty="0" smtClean="0"/>
-              <a:t>Wiring the entire application to a front-end for abstraction.</a:t>
+              <a:t>Wiring the entire application to a front-end for abstraction</a:t>
+            </a:r>
+            <a:r>
+              <a:rPr lang="en-US" dirty="0" smtClean="0"/>
+              <a:t>.</a:t>
+            </a:r>
+          </a:p>
+          <a:p>
+            <a:pPr lvl="1"/>
+            <a:r>
+              <a:rPr lang="en-US" dirty="0" smtClean="0"/>
+              <a:t>Extending the application to run for all </a:t>
+            </a:r>
+            <a:r>
+              <a:rPr lang="en-US" smtClean="0"/>
+              <a:t>the states in USA.</a:t>
             </a:r>
             <a:endParaRPr lang="en-US" dirty="0"/>
           </a:p>

</xml_diff>